<commit_message>
OS L5 small update
</commit_message>
<xml_diff>
--- a/OS/sp18/lectures/OSsp18_lec5_threads.pptx
+++ b/OS/sp18/lectures/OSsp18_lec5_threads.pptx
@@ -2096,7 +2096,7 @@
           <a:p>
             <a:fld id="{A56D09A2-A99C-5841-B72D-D7747D3CA1DA}" type="datetime1">
               <a:rPr lang="en-US" smtClean="0"/>
-              <a:t>2/2/18</a:t>
+              <a:t>2/5/18</a:t>
             </a:fld>
             <a:endParaRPr lang="en-US"/>
           </a:p>
@@ -2293,7 +2293,7 @@
           <a:p>
             <a:fld id="{B75CF23A-154B-1B46-8C27-8775A21F1E64}" type="datetime1">
               <a:rPr lang="en-US" smtClean="0"/>
-              <a:t>2/2/18</a:t>
+              <a:t>2/5/18</a:t>
             </a:fld>
             <a:endParaRPr lang="en-US"/>
           </a:p>
@@ -2499,7 +2499,7 @@
           <a:p>
             <a:fld id="{28E350AD-B9D4-6D48-AF44-7D8020DD8366}" type="datetime1">
               <a:rPr lang="en-US" smtClean="0"/>
-              <a:t>2/2/18</a:t>
+              <a:t>2/5/18</a:t>
             </a:fld>
             <a:endParaRPr lang="en-US"/>
           </a:p>
@@ -2762,7 +2762,7 @@
           <a:p>
             <a:fld id="{71F5F049-9362-0942-A938-2CB832CD658A}" type="datetime1">
               <a:rPr lang="en-US" smtClean="0"/>
-              <a:t>2/2/18</a:t>
+              <a:t>2/5/18</a:t>
             </a:fld>
             <a:endParaRPr lang="en-US"/>
           </a:p>
@@ -3025,7 +3025,7 @@
           <a:p>
             <a:fld id="{DEBC226D-C8E0-5543-8BA0-F48A0C8B1A65}" type="datetime1">
               <a:rPr lang="en-US" smtClean="0"/>
-              <a:t>2/2/18</a:t>
+              <a:t>2/5/18</a:t>
             </a:fld>
             <a:endParaRPr lang="en-US"/>
           </a:p>
@@ -3221,7 +3221,7 @@
           <a:p>
             <a:fld id="{BEF3DABB-2361-744A-9E62-AA8397BC6951}" type="datetime1">
               <a:rPr lang="en-US" smtClean="0"/>
-              <a:t>2/2/18</a:t>
+              <a:t>2/5/18</a:t>
             </a:fld>
             <a:endParaRPr lang="en-US"/>
           </a:p>
@@ -3439,7 +3439,7 @@
           <a:p>
             <a:fld id="{6ED9AB1A-A996-3E47-88EE-8BC78B2B2015}" type="datetime1">
               <a:rPr lang="en-US" smtClean="0"/>
-              <a:t>2/2/18</a:t>
+              <a:t>2/5/18</a:t>
             </a:fld>
             <a:endParaRPr lang="en-US"/>
           </a:p>
@@ -3753,7 +3753,7 @@
           <a:p>
             <a:fld id="{6E679556-04AA-6348-A42F-CF842725922E}" type="datetime1">
               <a:rPr lang="en-US" smtClean="0"/>
-              <a:t>2/2/18</a:t>
+              <a:t>2/5/18</a:t>
             </a:fld>
             <a:endParaRPr lang="en-US"/>
           </a:p>
@@ -4206,7 +4206,7 @@
           <a:p>
             <a:fld id="{83856A5E-515C-5945-8EBF-17B558B0A2FB}" type="datetime1">
               <a:rPr lang="en-US" smtClean="0"/>
-              <a:t>2/2/18</a:t>
+              <a:t>2/5/18</a:t>
             </a:fld>
             <a:endParaRPr lang="en-US"/>
           </a:p>
@@ -4350,7 +4350,7 @@
           <a:p>
             <a:fld id="{BD524653-E9EC-D640-AB32-9A1A04930337}" type="datetime1">
               <a:rPr lang="en-US" smtClean="0"/>
-              <a:t>2/2/18</a:t>
+              <a:t>2/5/18</a:t>
             </a:fld>
             <a:endParaRPr lang="en-US"/>
           </a:p>
@@ -4471,7 +4471,7 @@
           <a:p>
             <a:fld id="{173EEE0E-67DA-2442-A54A-C6300329C95A}" type="datetime1">
               <a:rPr lang="en-US" smtClean="0"/>
-              <a:t>2/2/18</a:t>
+              <a:t>2/5/18</a:t>
             </a:fld>
             <a:endParaRPr lang="en-US"/>
           </a:p>
@@ -4774,7 +4774,7 @@
           <a:p>
             <a:fld id="{EA86D162-DA20-0943-8678-D89426C9E423}" type="datetime1">
               <a:rPr lang="en-US" smtClean="0"/>
-              <a:t>2/2/18</a:t>
+              <a:t>2/5/18</a:t>
             </a:fld>
             <a:endParaRPr lang="en-US"/>
           </a:p>
@@ -5054,7 +5054,7 @@
           <a:p>
             <a:fld id="{0CBC6AFB-B921-F842-A3E6-83F1648EB80A}" type="datetime1">
               <a:rPr lang="en-US" smtClean="0"/>
-              <a:t>2/2/18</a:t>
+              <a:t>2/5/18</a:t>
             </a:fld>
             <a:endParaRPr lang="en-US"/>
           </a:p>
@@ -5353,7 +5353,7 @@
           <a:p>
             <a:fld id="{16254520-CA44-E946-B1D1-D2BA8457F36B}" type="datetime1">
               <a:rPr lang="en-US" smtClean="0"/>
-              <a:t>2/2/18</a:t>
+              <a:t>2/5/18</a:t>
             </a:fld>
             <a:endParaRPr lang="en-US"/>
           </a:p>
@@ -6178,13 +6178,7 @@
               <a:rPr lang="en-US" dirty="0" smtClean="0">
                 <a:latin typeface="Arial" charset="0"/>
               </a:rPr>
-              <a:t>Spring </a:t>
-            </a:r>
-            <a:r>
-              <a:rPr lang="en-US" dirty="0" smtClean="0">
-                <a:latin typeface="Arial" charset="0"/>
-              </a:rPr>
-              <a:t>2018</a:t>
+              <a:t>Spring 2018</a:t>
             </a:r>
             <a:endParaRPr lang="en-US" dirty="0">
               <a:latin typeface="Arial" charset="0"/>
@@ -6373,7 +6367,7 @@
           <a:p>
             <a:fld id="{BEF3DABB-2361-744A-9E62-AA8397BC6951}" type="datetime1">
               <a:rPr lang="en-US" smtClean="0"/>
-              <a:t>2/2/18</a:t>
+              <a:t>2/5/18</a:t>
             </a:fld>
             <a:endParaRPr lang="en-US"/>
           </a:p>
@@ -6602,7 +6596,7 @@
           <a:p>
             <a:fld id="{BEF3DABB-2361-744A-9E62-AA8397BC6951}" type="datetime1">
               <a:rPr lang="en-US" smtClean="0"/>
-              <a:t>2/2/18</a:t>
+              <a:t>2/5/18</a:t>
             </a:fld>
             <a:endParaRPr lang="en-US"/>
           </a:p>
@@ -6862,7 +6856,7 @@
           <a:p>
             <a:fld id="{BEF3DABB-2361-744A-9E62-AA8397BC6951}" type="datetime1">
               <a:rPr lang="en-US" smtClean="0"/>
-              <a:t>2/2/18</a:t>
+              <a:t>2/5/18</a:t>
             </a:fld>
             <a:endParaRPr lang="en-US"/>
           </a:p>
@@ -7204,7 +7198,7 @@
           <a:p>
             <a:fld id="{BEF3DABB-2361-744A-9E62-AA8397BC6951}" type="datetime1">
               <a:rPr lang="en-US" smtClean="0"/>
-              <a:t>2/2/18</a:t>
+              <a:t>2/5/18</a:t>
             </a:fld>
             <a:endParaRPr lang="en-US"/>
           </a:p>
@@ -8183,7 +8177,7 @@
           <a:p>
             <a:fld id="{BD524653-E9EC-D640-AB32-9A1A04930337}" type="datetime1">
               <a:rPr lang="en-US" smtClean="0"/>
-              <a:t>2/2/18</a:t>
+              <a:t>2/5/18</a:t>
             </a:fld>
             <a:endParaRPr lang="en-US"/>
           </a:p>
@@ -8412,7 +8406,7 @@
           <a:p>
             <a:fld id="{BEF3DABB-2361-744A-9E62-AA8397BC6951}" type="datetime1">
               <a:rPr lang="en-US" smtClean="0"/>
-              <a:t>2/2/18</a:t>
+              <a:t>2/5/18</a:t>
             </a:fld>
             <a:endParaRPr lang="en-US"/>
           </a:p>
@@ -8648,7 +8642,7 @@
           <a:p>
             <a:fld id="{BEF3DABB-2361-744A-9E62-AA8397BC6951}" type="datetime1">
               <a:rPr lang="en-US" smtClean="0"/>
-              <a:t>2/2/18</a:t>
+              <a:t>2/5/18</a:t>
             </a:fld>
             <a:endParaRPr lang="en-US"/>
           </a:p>
@@ -8770,7 +8764,7 @@
         <p:spPr/>
         <p:txBody>
           <a:bodyPr>
-            <a:normAutofit/>
+            <a:normAutofit lnSpcReduction="10000"/>
           </a:bodyPr>
           <a:lstStyle/>
           <a:p>
@@ -8797,9 +8791,36 @@
           <a:p>
             <a:pPr lvl="1"/>
             <a:r>
-              <a:rPr lang="en-US"/>
-              <a:t>Can access Ball 410 machines remotely or in person</a:t>
-            </a:r>
+              <a:rPr lang="en-US" dirty="0"/>
+              <a:t>Can access Ball 410 machines remotely or in </a:t>
+            </a:r>
+            <a:r>
+              <a:rPr lang="en-US" dirty="0" smtClean="0"/>
+              <a:t>person</a:t>
+            </a:r>
+          </a:p>
+          <a:p>
+            <a:pPr lvl="1"/>
+            <a:r>
+              <a:rPr lang="en-US" dirty="0" smtClean="0"/>
+              <a:t>Must reset password</a:t>
+            </a:r>
+          </a:p>
+          <a:p>
+            <a:pPr lvl="2"/>
+            <a:r>
+              <a:rPr lang="en-US" dirty="0" smtClean="0"/>
+              <a:t>Use </a:t>
+            </a:r>
+            <a:r>
+              <a:rPr lang="en-US" dirty="0" err="1" smtClean="0"/>
+              <a:t>passwd</a:t>
+            </a:r>
+            <a:r>
+              <a:rPr lang="en-US" dirty="0" smtClean="0"/>
+              <a:t> command at command line</a:t>
+            </a:r>
+            <a:endParaRPr lang="en-US" dirty="0"/>
           </a:p>
           <a:p>
             <a:pPr marL="344487" lvl="1" indent="0">
@@ -8965,7 +8986,7 @@
                 <a:latin typeface="Garamond"/>
                 <a:cs typeface="Garamond"/>
               </a:rPr>
-              <a:t>2/2/18</a:t>
+              <a:t>2/5/18</a:t>
             </a:fld>
             <a:endParaRPr lang="en-US" dirty="0">
               <a:latin typeface="Garamond"/>
@@ -9375,7 +9396,7 @@
           <a:p>
             <a:fld id="{BEF3DABB-2361-744A-9E62-AA8397BC6951}" type="datetime1">
               <a:rPr lang="en-US" smtClean="0"/>
-              <a:t>2/2/18</a:t>
+              <a:t>2/5/18</a:t>
             </a:fld>
             <a:endParaRPr lang="en-US"/>
           </a:p>
@@ -9645,7 +9666,7 @@
           <a:p>
             <a:fld id="{BEF3DABB-2361-744A-9E62-AA8397BC6951}" type="datetime1">
               <a:rPr lang="en-US" smtClean="0"/>
-              <a:t>2/2/18</a:t>
+              <a:t>2/5/18</a:t>
             </a:fld>
             <a:endParaRPr lang="en-US"/>
           </a:p>
@@ -9981,7 +10002,7 @@
           <a:p>
             <a:fld id="{BEF3DABB-2361-744A-9E62-AA8397BC6951}" type="datetime1">
               <a:rPr lang="en-US" smtClean="0"/>
-              <a:t>2/2/18</a:t>
+              <a:t>2/5/18</a:t>
             </a:fld>
             <a:endParaRPr lang="en-US"/>
           </a:p>
@@ -10228,7 +10249,7 @@
           <a:p>
             <a:fld id="{BEF3DABB-2361-744A-9E62-AA8397BC6951}" type="datetime1">
               <a:rPr lang="en-US" smtClean="0"/>
-              <a:t>2/2/18</a:t>
+              <a:t>2/5/18</a:t>
             </a:fld>
             <a:endParaRPr lang="en-US"/>
           </a:p>
@@ -10444,7 +10465,7 @@
           <a:p>
             <a:fld id="{BEF3DABB-2361-744A-9E62-AA8397BC6951}" type="datetime1">
               <a:rPr lang="en-US" smtClean="0"/>
-              <a:t>2/2/18</a:t>
+              <a:t>2/5/18</a:t>
             </a:fld>
             <a:endParaRPr lang="en-US"/>
           </a:p>
@@ -10578,8 +10599,19 @@
           <a:p>
             <a:pPr lvl="1"/>
             <a:r>
-              <a:rPr lang="en-US" dirty="0" smtClean="0"/>
-              <a:t>Detailed synchronization discussion</a:t>
+              <a:rPr lang="en-US" smtClean="0"/>
+              <a:t>More examples</a:t>
+            </a:r>
+          </a:p>
+          <a:p>
+            <a:pPr lvl="1"/>
+            <a:r>
+              <a:rPr lang="en-US" smtClean="0"/>
+              <a:t>Detailed </a:t>
+            </a:r>
+            <a:r>
+              <a:rPr lang="en-US" dirty="0" smtClean="0"/>
+              <a:t>synchronization discussion</a:t>
             </a:r>
           </a:p>
           <a:p>
@@ -10610,8 +10642,37 @@
             <a:pPr lvl="1"/>
             <a:r>
               <a:rPr lang="en-US" dirty="0" smtClean="0"/>
-              <a:t>Can access Ball 410 machines remotely or in person</a:t>
-            </a:r>
+              <a:t>Can access Ball 410 machines remotely or in </a:t>
+            </a:r>
+            <a:r>
+              <a:rPr lang="en-US" dirty="0" smtClean="0"/>
+              <a:t>person</a:t>
+            </a:r>
+          </a:p>
+          <a:p>
+            <a:pPr lvl="1"/>
+            <a:r>
+              <a:rPr lang="en-US" dirty="0"/>
+              <a:t>Must reset password</a:t>
+            </a:r>
+          </a:p>
+          <a:p>
+            <a:pPr lvl="2"/>
+            <a:r>
+              <a:rPr lang="en-US" dirty="0"/>
+              <a:t>Use </a:t>
+            </a:r>
+            <a:r>
+              <a:rPr lang="en-US" dirty="0" err="1"/>
+              <a:t>passwd</a:t>
+            </a:r>
+            <a:r>
+              <a:rPr lang="en-US" dirty="0"/>
+              <a:t> command at command line</a:t>
+            </a:r>
+          </a:p>
+          <a:p>
+            <a:pPr lvl="1"/>
             <a:endParaRPr lang="en-US" dirty="0"/>
           </a:p>
         </p:txBody>
@@ -10748,7 +10809,7 @@
           <a:p>
             <a:fld id="{D1010B0A-0923-F64F-BB98-DAF781549413}" type="datetime1">
               <a:rPr lang="en-US" smtClean="0"/>
-              <a:t>2/2/18</a:t>
+              <a:t>2/5/18</a:t>
             </a:fld>
             <a:endParaRPr lang="en-US"/>
           </a:p>
@@ -11053,7 +11114,7 @@
           <a:p>
             <a:fld id="{2BD1A3CB-CAD6-FB4B-9A5A-696854FE92B6}" type="datetime1">
               <a:rPr lang="en-US" smtClean="0"/>
-              <a:t>2/2/18</a:t>
+              <a:t>2/5/18</a:t>
             </a:fld>
             <a:endParaRPr lang="en-US"/>
           </a:p>
@@ -11273,7 +11334,7 @@
           <a:p>
             <a:fld id="{4436537C-429C-4C46-9DDE-6F4C2F56DB1F}" type="datetime1">
               <a:rPr lang="en-US" smtClean="0"/>
-              <a:t>2/2/18</a:t>
+              <a:t>2/5/18</a:t>
             </a:fld>
             <a:endParaRPr lang="en-US"/>
           </a:p>
@@ -11480,7 +11541,7 @@
           <a:p>
             <a:fld id="{A56A6035-4BD4-A640-B8D5-76F1EF6588D6}" type="datetime1">
               <a:rPr lang="en-US" smtClean="0"/>
-              <a:t>2/2/18</a:t>
+              <a:t>2/5/18</a:t>
             </a:fld>
             <a:endParaRPr lang="en-US"/>
           </a:p>
@@ -11707,7 +11768,7 @@
           <a:p>
             <a:fld id="{9E37ECA5-548F-3943-A668-C265EA7C6F40}" type="datetime1">
               <a:rPr lang="en-US" smtClean="0"/>
-              <a:t>2/2/18</a:t>
+              <a:t>2/5/18</a:t>
             </a:fld>
             <a:endParaRPr lang="en-US"/>
           </a:p>
@@ -12044,7 +12105,7 @@
           <a:p>
             <a:fld id="{283382A2-32A8-E046-9A3D-B21E50F3F668}" type="datetime1">
               <a:rPr lang="en-US" smtClean="0"/>
-              <a:t>2/2/18</a:t>
+              <a:t>2/5/18</a:t>
             </a:fld>
             <a:endParaRPr lang="en-US"/>
           </a:p>
@@ -12226,7 +12287,7 @@
           <a:p>
             <a:fld id="{7A22CDA3-757A-0144-8E6C-100AF964C322}" type="datetime1">
               <a:rPr lang="en-US" smtClean="0"/>
-              <a:t>2/2/18</a:t>
+              <a:t>2/5/18</a:t>
             </a:fld>
             <a:endParaRPr lang="en-US"/>
           </a:p>
@@ -12359,7 +12420,7 @@
           <a:p>
             <a:fld id="{BEF3DABB-2361-744A-9E62-AA8397BC6951}" type="datetime1">
               <a:rPr lang="en-US" smtClean="0"/>
-              <a:t>2/2/18</a:t>
+              <a:t>2/5/18</a:t>
             </a:fld>
             <a:endParaRPr lang="en-US"/>
           </a:p>
@@ -12609,7 +12670,7 @@
           <a:p>
             <a:fld id="{BD524653-E9EC-D640-AB32-9A1A04930337}" type="datetime1">
               <a:rPr lang="en-US" smtClean="0"/>
-              <a:t>2/2/18</a:t>
+              <a:t>2/5/18</a:t>
             </a:fld>
             <a:endParaRPr lang="en-US"/>
           </a:p>

</xml_diff>